<commit_message>
quick fix in opening inital file
</commit_message>
<xml_diff>
--- a/presentation 2012 350@brendan-anthony.pptx
+++ b/presentation 2012 350@brendan-anthony.pptx
@@ -6,6 +6,10 @@
   </p:sldMasterIdLst>
   <p:sldIdLst>
     <p:sldId id="256" r:id="rId2"/>
+    <p:sldId id="257" r:id="rId3"/>
+    <p:sldId id="258" r:id="rId4"/>
+    <p:sldId id="259" r:id="rId5"/>
+    <p:sldId id="260" r:id="rId6"/>
   </p:sldIdLst>
   <p:sldSz cx="12188825" cy="6858000"/>
   <p:notesSz cx="6858000" cy="9144000"/>
@@ -104,6 +108,11 @@
       </a:defRPr>
     </a:lvl9pPr>
   </p:defaultTextStyle>
+  <p:extLst>
+    <p:ext uri="{EFAFB233-063F-42B5-8137-9DF3F51BA10A}">
+      <p15:sldGuideLst xmlns:p15="http://schemas.microsoft.com/office/powerpoint/2012/main"/>
+    </p:ext>
+  </p:extLst>
 </p:presentation>
 </file>
 
@@ -299,7 +308,7 @@
             <a:fld id="{B61BEF0D-F0BB-DE4B-95CE-6DB70DBA9567}" type="datetimeFigureOut">
               <a:rPr lang="en-US"/>
               <a:pPr/>
-              <a:t>11/27/2012</a:t>
+              <a:t>11/30/2012</a:t>
             </a:fld>
             <a:endParaRPr lang="en-US"/>
           </a:p>
@@ -589,7 +598,7 @@
             <a:fld id="{B61BEF0D-F0BB-DE4B-95CE-6DB70DBA9567}" type="datetimeFigureOut">
               <a:rPr lang="en-US"/>
               <a:pPr/>
-              <a:t>11/27/2012</a:t>
+              <a:t>11/30/2012</a:t>
             </a:fld>
             <a:endParaRPr lang="en-US"/>
           </a:p>
@@ -1159,7 +1168,7 @@
             <a:fld id="{B61BEF0D-F0BB-DE4B-95CE-6DB70DBA9567}" type="datetimeFigureOut">
               <a:rPr lang="en-US"/>
               <a:pPr/>
-              <a:t>11/27/2012</a:t>
+              <a:t>11/30/2012</a:t>
             </a:fld>
             <a:endParaRPr lang="en-US"/>
           </a:p>
@@ -1590,7 +1599,7 @@
             <a:fld id="{B61BEF0D-F0BB-DE4B-95CE-6DB70DBA9567}" type="datetimeFigureOut">
               <a:rPr lang="en-US"/>
               <a:pPr/>
-              <a:t>11/27/2012</a:t>
+              <a:t>11/30/2012</a:t>
             </a:fld>
             <a:endParaRPr lang="en-US"/>
           </a:p>
@@ -2321,7 +2330,7 @@
             <a:fld id="{B61BEF0D-F0BB-DE4B-95CE-6DB70DBA9567}" type="datetimeFigureOut">
               <a:rPr lang="en-US"/>
               <a:pPr/>
-              <a:t>11/27/2012</a:t>
+              <a:t>11/30/2012</a:t>
             </a:fld>
             <a:endParaRPr lang="en-US"/>
           </a:p>
@@ -2752,7 +2761,7 @@
             <a:fld id="{B61BEF0D-F0BB-DE4B-95CE-6DB70DBA9567}" type="datetimeFigureOut">
               <a:rPr lang="en-US"/>
               <a:pPr/>
-              <a:t>11/27/2012</a:t>
+              <a:t>11/30/2012</a:t>
             </a:fld>
             <a:endParaRPr lang="en-US"/>
           </a:p>
@@ -3480,7 +3489,7 @@
             <a:fld id="{B61BEF0D-F0BB-DE4B-95CE-6DB70DBA9567}" type="datetimeFigureOut">
               <a:rPr lang="en-US"/>
               <a:pPr/>
-              <a:t>11/27/2012</a:t>
+              <a:t>11/30/2012</a:t>
             </a:fld>
             <a:endParaRPr lang="en-US"/>
           </a:p>
@@ -3897,7 +3906,7 @@
             <a:fld id="{B61BEF0D-F0BB-DE4B-95CE-6DB70DBA9567}" type="datetimeFigureOut">
               <a:rPr lang="en-US"/>
               <a:pPr/>
-              <a:t>11/27/2012</a:t>
+              <a:t>11/30/2012</a:t>
             </a:fld>
             <a:endParaRPr lang="en-US"/>
           </a:p>
@@ -4249,7 +4258,7 @@
             <a:fld id="{B61BEF0D-F0BB-DE4B-95CE-6DB70DBA9567}" type="datetimeFigureOut">
               <a:rPr lang="en-US"/>
               <a:pPr/>
-              <a:t>11/27/2012</a:t>
+              <a:t>11/30/2012</a:t>
             </a:fld>
             <a:endParaRPr lang="en-US"/>
           </a:p>
@@ -4591,7 +4600,7 @@
             <a:fld id="{B61BEF0D-F0BB-DE4B-95CE-6DB70DBA9567}" type="datetimeFigureOut">
               <a:rPr lang="en-US"/>
               <a:pPr/>
-              <a:t>11/27/2012</a:t>
+              <a:t>11/30/2012</a:t>
             </a:fld>
             <a:endParaRPr lang="en-US"/>
           </a:p>
@@ -5013,7 +5022,7 @@
             <a:fld id="{B61BEF0D-F0BB-DE4B-95CE-6DB70DBA9567}" type="datetimeFigureOut">
               <a:rPr lang="en-US"/>
               <a:pPr/>
-              <a:t>11/27/2012</a:t>
+              <a:t>11/30/2012</a:t>
             </a:fld>
             <a:endParaRPr lang="en-US"/>
           </a:p>
@@ -5477,7 +5486,7 @@
             <a:fld id="{B61BEF0D-F0BB-DE4B-95CE-6DB70DBA9567}" type="datetimeFigureOut">
               <a:rPr lang="en-US"/>
               <a:pPr/>
-              <a:t>11/27/2012</a:t>
+              <a:t>11/30/2012</a:t>
             </a:fld>
             <a:endParaRPr lang="en-US"/>
           </a:p>
@@ -6087,7 +6096,7 @@
             <a:fld id="{B61BEF0D-F0BB-DE4B-95CE-6DB70DBA9567}" type="datetimeFigureOut">
               <a:rPr lang="en-US"/>
               <a:pPr/>
-              <a:t>11/27/2012</a:t>
+              <a:t>11/30/2012</a:t>
             </a:fld>
             <a:endParaRPr lang="en-US"/>
           </a:p>
@@ -6377,7 +6386,7 @@
             <a:fld id="{B61BEF0D-F0BB-DE4B-95CE-6DB70DBA9567}" type="datetimeFigureOut">
               <a:rPr lang="en-US"/>
               <a:pPr/>
-              <a:t>11/27/2012</a:t>
+              <a:t>11/30/2012</a:t>
             </a:fld>
             <a:endParaRPr lang="en-US"/>
           </a:p>
@@ -6644,7 +6653,7 @@
             <a:fld id="{B61BEF0D-F0BB-DE4B-95CE-6DB70DBA9567}" type="datetimeFigureOut">
               <a:rPr lang="en-US"/>
               <a:pPr/>
-              <a:t>11/27/2012</a:t>
+              <a:t>11/30/2012</a:t>
             </a:fld>
             <a:endParaRPr lang="en-US"/>
           </a:p>
@@ -7099,7 +7108,7 @@
             <a:fld id="{B61BEF0D-F0BB-DE4B-95CE-6DB70DBA9567}" type="datetimeFigureOut">
               <a:rPr lang="en-US"/>
               <a:pPr/>
-              <a:t>11/27/2012</a:t>
+              <a:t>11/30/2012</a:t>
             </a:fld>
             <a:endParaRPr lang="en-US"/>
           </a:p>
@@ -7467,7 +7476,7 @@
             <a:fld id="{B61BEF0D-F0BB-DE4B-95CE-6DB70DBA9567}" type="datetimeFigureOut">
               <a:rPr lang="en-US"/>
               <a:pPr/>
-              <a:t>11/27/2012</a:t>
+              <a:t>11/30/2012</a:t>
             </a:fld>
             <a:endParaRPr lang="en-US"/>
           </a:p>
@@ -7947,7 +7956,7 @@
             <a:fld id="{B61BEF0D-F0BB-DE4B-95CE-6DB70DBA9567}" type="datetimeFigureOut">
               <a:rPr lang="en-US" smtClean="0"/>
               <a:pPr/>
-              <a:t>11/27/2012</a:t>
+              <a:t>11/30/2012</a:t>
             </a:fld>
             <a:endParaRPr lang="en-US" dirty="0"/>
           </a:p>
@@ -8480,6 +8489,354 @@
     <p:extLst>
       <p:ext uri="{BB962C8B-B14F-4D97-AF65-F5344CB8AC3E}">
         <p14:creationId xmlns:p14="http://schemas.microsoft.com/office/powerpoint/2010/main" val="3821629841"/>
+      </p:ext>
+    </p:extLst>
+  </p:cSld>
+  <p:clrMapOvr>
+    <a:masterClrMapping/>
+  </p:clrMapOvr>
+  <p:timing>
+    <p:tnLst>
+      <p:par>
+        <p:cTn id="1" dur="indefinite" restart="never" nodeType="tmRoot"/>
+      </p:par>
+    </p:tnLst>
+  </p:timing>
+</p:sld>
+</file>
+
+<file path=ppt/slides/slide2.xml><?xml version="1.0" encoding="utf-8"?>
+<p:sld xmlns:a="http://schemas.openxmlformats.org/drawingml/2006/main" xmlns:r="http://schemas.openxmlformats.org/officeDocument/2006/relationships" xmlns:p="http://schemas.openxmlformats.org/presentationml/2006/main">
+  <p:cSld>
+    <p:spTree>
+      <p:nvGrpSpPr>
+        <p:cNvPr id="1" name=""/>
+        <p:cNvGrpSpPr/>
+        <p:nvPr/>
+      </p:nvGrpSpPr>
+      <p:grpSpPr>
+        <a:xfrm>
+          <a:off x="0" y="0"/>
+          <a:ext cx="0" cy="0"/>
+          <a:chOff x="0" y="0"/>
+          <a:chExt cx="0" cy="0"/>
+        </a:xfrm>
+      </p:grpSpPr>
+      <p:sp>
+        <p:nvSpPr>
+          <p:cNvPr id="2" name="Title 1"/>
+          <p:cNvSpPr>
+            <a:spLocks noGrp="1"/>
+          </p:cNvSpPr>
+          <p:nvPr>
+            <p:ph type="title"/>
+          </p:nvPr>
+        </p:nvSpPr>
+        <p:spPr/>
+        <p:txBody>
+          <a:bodyPr/>
+          <a:lstStyle/>
+          <a:p>
+            <a:endParaRPr lang="en-CA" dirty="0"/>
+          </a:p>
+        </p:txBody>
+      </p:sp>
+      <p:sp>
+        <p:nvSpPr>
+          <p:cNvPr id="3" name="Content Placeholder 2"/>
+          <p:cNvSpPr>
+            <a:spLocks noGrp="1"/>
+          </p:cNvSpPr>
+          <p:nvPr>
+            <p:ph idx="1"/>
+          </p:nvPr>
+        </p:nvSpPr>
+        <p:spPr/>
+        <p:txBody>
+          <a:bodyPr/>
+          <a:lstStyle/>
+          <a:p>
+            <a:endParaRPr lang="en-CA" dirty="0"/>
+          </a:p>
+        </p:txBody>
+      </p:sp>
+      <p:pic>
+        <p:nvPicPr>
+          <p:cNvPr id="6" name="Picture 5"/>
+          <p:cNvPicPr>
+            <a:picLocks noChangeAspect="1"/>
+          </p:cNvPicPr>
+          <p:nvPr/>
+        </p:nvPicPr>
+        <p:blipFill>
+          <a:blip r:embed="rId2"/>
+          <a:stretch>
+            <a:fillRect/>
+          </a:stretch>
+        </p:blipFill>
+        <p:spPr>
+          <a:xfrm>
+            <a:off x="421098" y="2672292"/>
+            <a:ext cx="4095750" cy="3257550"/>
+          </a:xfrm>
+          <a:prstGeom prst="rect">
+            <a:avLst/>
+          </a:prstGeom>
+        </p:spPr>
+      </p:pic>
+      <p:pic>
+        <p:nvPicPr>
+          <p:cNvPr id="7" name="Picture 6"/>
+          <p:cNvPicPr>
+            <a:picLocks noChangeAspect="1"/>
+          </p:cNvPicPr>
+          <p:nvPr/>
+        </p:nvPicPr>
+        <p:blipFill>
+          <a:blip r:embed="rId3"/>
+          <a:stretch>
+            <a:fillRect/>
+          </a:stretch>
+        </p:blipFill>
+        <p:spPr>
+          <a:xfrm>
+            <a:off x="415924" y="369360"/>
+            <a:ext cx="3429000" cy="2209800"/>
+          </a:xfrm>
+          <a:prstGeom prst="rect">
+            <a:avLst/>
+          </a:prstGeom>
+        </p:spPr>
+      </p:pic>
+    </p:spTree>
+    <p:extLst>
+      <p:ext uri="{BB962C8B-B14F-4D97-AF65-F5344CB8AC3E}">
+        <p14:creationId xmlns:p14="http://schemas.microsoft.com/office/powerpoint/2010/main" val="4239688365"/>
+      </p:ext>
+    </p:extLst>
+  </p:cSld>
+  <p:clrMapOvr>
+    <a:masterClrMapping/>
+  </p:clrMapOvr>
+  <p:timing>
+    <p:tnLst>
+      <p:par>
+        <p:cTn id="1" dur="indefinite" restart="never" nodeType="tmRoot"/>
+      </p:par>
+    </p:tnLst>
+  </p:timing>
+</p:sld>
+</file>
+
+<file path=ppt/slides/slide3.xml><?xml version="1.0" encoding="utf-8"?>
+<p:sld xmlns:a="http://schemas.openxmlformats.org/drawingml/2006/main" xmlns:r="http://schemas.openxmlformats.org/officeDocument/2006/relationships" xmlns:p="http://schemas.openxmlformats.org/presentationml/2006/main">
+  <p:cSld>
+    <p:spTree>
+      <p:nvGrpSpPr>
+        <p:cNvPr id="1" name=""/>
+        <p:cNvGrpSpPr/>
+        <p:nvPr/>
+      </p:nvGrpSpPr>
+      <p:grpSpPr>
+        <a:xfrm>
+          <a:off x="0" y="0"/>
+          <a:ext cx="0" cy="0"/>
+          <a:chOff x="0" y="0"/>
+          <a:chExt cx="0" cy="0"/>
+        </a:xfrm>
+      </p:grpSpPr>
+      <p:sp>
+        <p:nvSpPr>
+          <p:cNvPr id="2" name="Title 1"/>
+          <p:cNvSpPr>
+            <a:spLocks noGrp="1"/>
+          </p:cNvSpPr>
+          <p:nvPr>
+            <p:ph type="title"/>
+          </p:nvPr>
+        </p:nvSpPr>
+        <p:spPr/>
+        <p:txBody>
+          <a:bodyPr/>
+          <a:lstStyle/>
+          <a:p>
+            <a:endParaRPr lang="en-CA"/>
+          </a:p>
+        </p:txBody>
+      </p:sp>
+      <p:sp>
+        <p:nvSpPr>
+          <p:cNvPr id="3" name="Content Placeholder 2"/>
+          <p:cNvSpPr>
+            <a:spLocks noGrp="1"/>
+          </p:cNvSpPr>
+          <p:nvPr>
+            <p:ph idx="1"/>
+          </p:nvPr>
+        </p:nvSpPr>
+        <p:spPr/>
+        <p:txBody>
+          <a:bodyPr/>
+          <a:lstStyle/>
+          <a:p>
+            <a:endParaRPr lang="en-CA"/>
+          </a:p>
+        </p:txBody>
+      </p:sp>
+    </p:spTree>
+    <p:extLst>
+      <p:ext uri="{BB962C8B-B14F-4D97-AF65-F5344CB8AC3E}">
+        <p14:creationId xmlns:p14="http://schemas.microsoft.com/office/powerpoint/2010/main" val="42153519"/>
+      </p:ext>
+    </p:extLst>
+  </p:cSld>
+  <p:clrMapOvr>
+    <a:masterClrMapping/>
+  </p:clrMapOvr>
+  <p:timing>
+    <p:tnLst>
+      <p:par>
+        <p:cTn id="1" dur="indefinite" restart="never" nodeType="tmRoot"/>
+      </p:par>
+    </p:tnLst>
+  </p:timing>
+</p:sld>
+</file>
+
+<file path=ppt/slides/slide4.xml><?xml version="1.0" encoding="utf-8"?>
+<p:sld xmlns:a="http://schemas.openxmlformats.org/drawingml/2006/main" xmlns:r="http://schemas.openxmlformats.org/officeDocument/2006/relationships" xmlns:p="http://schemas.openxmlformats.org/presentationml/2006/main">
+  <p:cSld>
+    <p:spTree>
+      <p:nvGrpSpPr>
+        <p:cNvPr id="1" name=""/>
+        <p:cNvGrpSpPr/>
+        <p:nvPr/>
+      </p:nvGrpSpPr>
+      <p:grpSpPr>
+        <a:xfrm>
+          <a:off x="0" y="0"/>
+          <a:ext cx="0" cy="0"/>
+          <a:chOff x="0" y="0"/>
+          <a:chExt cx="0" cy="0"/>
+        </a:xfrm>
+      </p:grpSpPr>
+      <p:sp>
+        <p:nvSpPr>
+          <p:cNvPr id="2" name="Title 1"/>
+          <p:cNvSpPr>
+            <a:spLocks noGrp="1"/>
+          </p:cNvSpPr>
+          <p:nvPr>
+            <p:ph type="title"/>
+          </p:nvPr>
+        </p:nvSpPr>
+        <p:spPr/>
+        <p:txBody>
+          <a:bodyPr/>
+          <a:lstStyle/>
+          <a:p>
+            <a:endParaRPr lang="en-CA"/>
+          </a:p>
+        </p:txBody>
+      </p:sp>
+      <p:sp>
+        <p:nvSpPr>
+          <p:cNvPr id="3" name="Content Placeholder 2"/>
+          <p:cNvSpPr>
+            <a:spLocks noGrp="1"/>
+          </p:cNvSpPr>
+          <p:nvPr>
+            <p:ph idx="1"/>
+          </p:nvPr>
+        </p:nvSpPr>
+        <p:spPr/>
+        <p:txBody>
+          <a:bodyPr/>
+          <a:lstStyle/>
+          <a:p>
+            <a:endParaRPr lang="en-CA"/>
+          </a:p>
+        </p:txBody>
+      </p:sp>
+    </p:spTree>
+    <p:extLst>
+      <p:ext uri="{BB962C8B-B14F-4D97-AF65-F5344CB8AC3E}">
+        <p14:creationId xmlns:p14="http://schemas.microsoft.com/office/powerpoint/2010/main" val="3374617454"/>
+      </p:ext>
+    </p:extLst>
+  </p:cSld>
+  <p:clrMapOvr>
+    <a:masterClrMapping/>
+  </p:clrMapOvr>
+  <p:timing>
+    <p:tnLst>
+      <p:par>
+        <p:cTn id="1" dur="indefinite" restart="never" nodeType="tmRoot"/>
+      </p:par>
+    </p:tnLst>
+  </p:timing>
+</p:sld>
+</file>
+
+<file path=ppt/slides/slide5.xml><?xml version="1.0" encoding="utf-8"?>
+<p:sld xmlns:a="http://schemas.openxmlformats.org/drawingml/2006/main" xmlns:r="http://schemas.openxmlformats.org/officeDocument/2006/relationships" xmlns:p="http://schemas.openxmlformats.org/presentationml/2006/main">
+  <p:cSld>
+    <p:spTree>
+      <p:nvGrpSpPr>
+        <p:cNvPr id="1" name=""/>
+        <p:cNvGrpSpPr/>
+        <p:nvPr/>
+      </p:nvGrpSpPr>
+      <p:grpSpPr>
+        <a:xfrm>
+          <a:off x="0" y="0"/>
+          <a:ext cx="0" cy="0"/>
+          <a:chOff x="0" y="0"/>
+          <a:chExt cx="0" cy="0"/>
+        </a:xfrm>
+      </p:grpSpPr>
+      <p:sp>
+        <p:nvSpPr>
+          <p:cNvPr id="2" name="Title 1"/>
+          <p:cNvSpPr>
+            <a:spLocks noGrp="1"/>
+          </p:cNvSpPr>
+          <p:nvPr>
+            <p:ph type="title"/>
+          </p:nvPr>
+        </p:nvSpPr>
+        <p:spPr/>
+        <p:txBody>
+          <a:bodyPr/>
+          <a:lstStyle/>
+          <a:p>
+            <a:endParaRPr lang="en-CA"/>
+          </a:p>
+        </p:txBody>
+      </p:sp>
+      <p:sp>
+        <p:nvSpPr>
+          <p:cNvPr id="3" name="Content Placeholder 2"/>
+          <p:cNvSpPr>
+            <a:spLocks noGrp="1"/>
+          </p:cNvSpPr>
+          <p:nvPr>
+            <p:ph idx="1"/>
+          </p:nvPr>
+        </p:nvSpPr>
+        <p:spPr/>
+        <p:txBody>
+          <a:bodyPr/>
+          <a:lstStyle/>
+          <a:p>
+            <a:endParaRPr lang="en-CA"/>
+          </a:p>
+        </p:txBody>
+      </p:sp>
+    </p:spTree>
+    <p:extLst>
+      <p:ext uri="{BB962C8B-B14F-4D97-AF65-F5344CB8AC3E}">
+        <p14:creationId xmlns:p14="http://schemas.microsoft.com/office/powerpoint/2010/main" val="3377074906"/>
       </p:ext>
     </p:extLst>
   </p:cSld>

</xml_diff>

<commit_message>
forgot some of of the changes
</commit_message>
<xml_diff>
--- a/presentation 2012 350@brendan-anthony.pptx
+++ b/presentation 2012 350@brendan-anthony.pptx
@@ -6,10 +6,14 @@
   </p:sldMasterIdLst>
   <p:sldIdLst>
     <p:sldId id="256" r:id="rId2"/>
-    <p:sldId id="257" r:id="rId3"/>
-    <p:sldId id="258" r:id="rId4"/>
+    <p:sldId id="258" r:id="rId3"/>
+    <p:sldId id="257" r:id="rId4"/>
     <p:sldId id="259" r:id="rId5"/>
-    <p:sldId id="260" r:id="rId6"/>
+    <p:sldId id="264" r:id="rId6"/>
+    <p:sldId id="263" r:id="rId7"/>
+    <p:sldId id="262" r:id="rId8"/>
+    <p:sldId id="260" r:id="rId9"/>
+    <p:sldId id="261" r:id="rId10"/>
   </p:sldIdLst>
   <p:sldSz cx="12188825" cy="6858000"/>
   <p:notesSz cx="6858000" cy="9144000"/>
@@ -308,7 +312,7 @@
             <a:fld id="{B61BEF0D-F0BB-DE4B-95CE-6DB70DBA9567}" type="datetimeFigureOut">
               <a:rPr lang="en-US"/>
               <a:pPr/>
-              <a:t>11/30/2012</a:t>
+              <a:t>12/1/2012</a:t>
             </a:fld>
             <a:endParaRPr lang="en-US"/>
           </a:p>
@@ -598,7 +602,7 @@
             <a:fld id="{B61BEF0D-F0BB-DE4B-95CE-6DB70DBA9567}" type="datetimeFigureOut">
               <a:rPr lang="en-US"/>
               <a:pPr/>
-              <a:t>11/30/2012</a:t>
+              <a:t>12/1/2012</a:t>
             </a:fld>
             <a:endParaRPr lang="en-US"/>
           </a:p>
@@ -1168,7 +1172,7 @@
             <a:fld id="{B61BEF0D-F0BB-DE4B-95CE-6DB70DBA9567}" type="datetimeFigureOut">
               <a:rPr lang="en-US"/>
               <a:pPr/>
-              <a:t>11/30/2012</a:t>
+              <a:t>12/1/2012</a:t>
             </a:fld>
             <a:endParaRPr lang="en-US"/>
           </a:p>
@@ -1599,7 +1603,7 @@
             <a:fld id="{B61BEF0D-F0BB-DE4B-95CE-6DB70DBA9567}" type="datetimeFigureOut">
               <a:rPr lang="en-US"/>
               <a:pPr/>
-              <a:t>11/30/2012</a:t>
+              <a:t>12/1/2012</a:t>
             </a:fld>
             <a:endParaRPr lang="en-US"/>
           </a:p>
@@ -2330,7 +2334,7 @@
             <a:fld id="{B61BEF0D-F0BB-DE4B-95CE-6DB70DBA9567}" type="datetimeFigureOut">
               <a:rPr lang="en-US"/>
               <a:pPr/>
-              <a:t>11/30/2012</a:t>
+              <a:t>12/1/2012</a:t>
             </a:fld>
             <a:endParaRPr lang="en-US"/>
           </a:p>
@@ -2761,7 +2765,7 @@
             <a:fld id="{B61BEF0D-F0BB-DE4B-95CE-6DB70DBA9567}" type="datetimeFigureOut">
               <a:rPr lang="en-US"/>
               <a:pPr/>
-              <a:t>11/30/2012</a:t>
+              <a:t>12/1/2012</a:t>
             </a:fld>
             <a:endParaRPr lang="en-US"/>
           </a:p>
@@ -3489,7 +3493,7 @@
             <a:fld id="{B61BEF0D-F0BB-DE4B-95CE-6DB70DBA9567}" type="datetimeFigureOut">
               <a:rPr lang="en-US"/>
               <a:pPr/>
-              <a:t>11/30/2012</a:t>
+              <a:t>12/1/2012</a:t>
             </a:fld>
             <a:endParaRPr lang="en-US"/>
           </a:p>
@@ -3906,7 +3910,7 @@
             <a:fld id="{B61BEF0D-F0BB-DE4B-95CE-6DB70DBA9567}" type="datetimeFigureOut">
               <a:rPr lang="en-US"/>
               <a:pPr/>
-              <a:t>11/30/2012</a:t>
+              <a:t>12/1/2012</a:t>
             </a:fld>
             <a:endParaRPr lang="en-US"/>
           </a:p>
@@ -4258,7 +4262,7 @@
             <a:fld id="{B61BEF0D-F0BB-DE4B-95CE-6DB70DBA9567}" type="datetimeFigureOut">
               <a:rPr lang="en-US"/>
               <a:pPr/>
-              <a:t>11/30/2012</a:t>
+              <a:t>12/1/2012</a:t>
             </a:fld>
             <a:endParaRPr lang="en-US"/>
           </a:p>
@@ -4600,7 +4604,7 @@
             <a:fld id="{B61BEF0D-F0BB-DE4B-95CE-6DB70DBA9567}" type="datetimeFigureOut">
               <a:rPr lang="en-US"/>
               <a:pPr/>
-              <a:t>11/30/2012</a:t>
+              <a:t>12/1/2012</a:t>
             </a:fld>
             <a:endParaRPr lang="en-US"/>
           </a:p>
@@ -5022,7 +5026,7 @@
             <a:fld id="{B61BEF0D-F0BB-DE4B-95CE-6DB70DBA9567}" type="datetimeFigureOut">
               <a:rPr lang="en-US"/>
               <a:pPr/>
-              <a:t>11/30/2012</a:t>
+              <a:t>12/1/2012</a:t>
             </a:fld>
             <a:endParaRPr lang="en-US"/>
           </a:p>
@@ -5486,7 +5490,7 @@
             <a:fld id="{B61BEF0D-F0BB-DE4B-95CE-6DB70DBA9567}" type="datetimeFigureOut">
               <a:rPr lang="en-US"/>
               <a:pPr/>
-              <a:t>11/30/2012</a:t>
+              <a:t>12/1/2012</a:t>
             </a:fld>
             <a:endParaRPr lang="en-US"/>
           </a:p>
@@ -6096,7 +6100,7 @@
             <a:fld id="{B61BEF0D-F0BB-DE4B-95CE-6DB70DBA9567}" type="datetimeFigureOut">
               <a:rPr lang="en-US"/>
               <a:pPr/>
-              <a:t>11/30/2012</a:t>
+              <a:t>12/1/2012</a:t>
             </a:fld>
             <a:endParaRPr lang="en-US"/>
           </a:p>
@@ -6386,7 +6390,7 @@
             <a:fld id="{B61BEF0D-F0BB-DE4B-95CE-6DB70DBA9567}" type="datetimeFigureOut">
               <a:rPr lang="en-US"/>
               <a:pPr/>
-              <a:t>11/30/2012</a:t>
+              <a:t>12/1/2012</a:t>
             </a:fld>
             <a:endParaRPr lang="en-US"/>
           </a:p>
@@ -6653,7 +6657,7 @@
             <a:fld id="{B61BEF0D-F0BB-DE4B-95CE-6DB70DBA9567}" type="datetimeFigureOut">
               <a:rPr lang="en-US"/>
               <a:pPr/>
-              <a:t>11/30/2012</a:t>
+              <a:t>12/1/2012</a:t>
             </a:fld>
             <a:endParaRPr lang="en-US"/>
           </a:p>
@@ -7108,7 +7112,7 @@
             <a:fld id="{B61BEF0D-F0BB-DE4B-95CE-6DB70DBA9567}" type="datetimeFigureOut">
               <a:rPr lang="en-US"/>
               <a:pPr/>
-              <a:t>11/30/2012</a:t>
+              <a:t>12/1/2012</a:t>
             </a:fld>
             <a:endParaRPr lang="en-US"/>
           </a:p>
@@ -7476,7 +7480,7 @@
             <a:fld id="{B61BEF0D-F0BB-DE4B-95CE-6DB70DBA9567}" type="datetimeFigureOut">
               <a:rPr lang="en-US"/>
               <a:pPr/>
-              <a:t>11/30/2012</a:t>
+              <a:t>12/1/2012</a:t>
             </a:fld>
             <a:endParaRPr lang="en-US"/>
           </a:p>
@@ -7956,7 +7960,7 @@
             <a:fld id="{B61BEF0D-F0BB-DE4B-95CE-6DB70DBA9567}" type="datetimeFigureOut">
               <a:rPr lang="en-US" smtClean="0"/>
               <a:pPr/>
-              <a:t>11/30/2012</a:t>
+              <a:t>12/1/2012</a:t>
             </a:fld>
             <a:endParaRPr lang="en-US" dirty="0"/>
           </a:p>
@@ -8481,7 +8485,19 @@
           <a:bodyPr/>
           <a:lstStyle/>
           <a:p>
-            <a:endParaRPr lang="en-CA" dirty="0"/>
+            <a:r>
+              <a:rPr lang="en-CA" dirty="0" smtClean="0"/>
+              <a:t>Anthony Ou</a:t>
+            </a:r>
+            <a:r>
+              <a:rPr lang="en-CA" dirty="0"/>
+              <a:t> </a:t>
+            </a:r>
+            <a:r>
+              <a:rPr lang="en-CA" dirty="0" smtClean="0"/>
+              <a:t>&amp; Brendan Anderson</a:t>
+            </a:r>
+            <a:endParaRPr lang="en-CA" dirty="0" smtClean="0"/>
           </a:p>
         </p:txBody>
       </p:sp>
@@ -8537,7 +8553,7 @@
           <a:bodyPr/>
           <a:lstStyle/>
           <a:p>
-            <a:endParaRPr lang="en-CA" dirty="0"/>
+            <a:endParaRPr lang="en-CA"/>
           </a:p>
         </p:txBody>
       </p:sp>
@@ -8556,62 +8572,14 @@
           <a:bodyPr/>
           <a:lstStyle/>
           <a:p>
-            <a:endParaRPr lang="en-CA" dirty="0"/>
-          </a:p>
-        </p:txBody>
-      </p:sp>
-      <p:pic>
-        <p:nvPicPr>
-          <p:cNvPr id="6" name="Picture 5"/>
-          <p:cNvPicPr>
-            <a:picLocks noChangeAspect="1"/>
-          </p:cNvPicPr>
-          <p:nvPr/>
-        </p:nvPicPr>
-        <p:blipFill>
-          <a:blip r:embed="rId2"/>
-          <a:stretch>
-            <a:fillRect/>
-          </a:stretch>
-        </p:blipFill>
-        <p:spPr>
-          <a:xfrm>
-            <a:off x="421098" y="2672292"/>
-            <a:ext cx="4095750" cy="3257550"/>
-          </a:xfrm>
-          <a:prstGeom prst="rect">
-            <a:avLst/>
-          </a:prstGeom>
-        </p:spPr>
-      </p:pic>
-      <p:pic>
-        <p:nvPicPr>
-          <p:cNvPr id="7" name="Picture 6"/>
-          <p:cNvPicPr>
-            <a:picLocks noChangeAspect="1"/>
-          </p:cNvPicPr>
-          <p:nvPr/>
-        </p:nvPicPr>
-        <p:blipFill>
-          <a:blip r:embed="rId3"/>
-          <a:stretch>
-            <a:fillRect/>
-          </a:stretch>
-        </p:blipFill>
-        <p:spPr>
-          <a:xfrm>
-            <a:off x="415924" y="369360"/>
-            <a:ext cx="3429000" cy="2209800"/>
-          </a:xfrm>
-          <a:prstGeom prst="rect">
-            <a:avLst/>
-          </a:prstGeom>
-        </p:spPr>
-      </p:pic>
+            <a:endParaRPr lang="en-CA"/>
+          </a:p>
+        </p:txBody>
+      </p:sp>
     </p:spTree>
     <p:extLst>
       <p:ext uri="{BB962C8B-B14F-4D97-AF65-F5344CB8AC3E}">
-        <p14:creationId xmlns:p14="http://schemas.microsoft.com/office/powerpoint/2010/main" val="4239688365"/>
+        <p14:creationId xmlns:p14="http://schemas.microsoft.com/office/powerpoint/2010/main" val="42153519"/>
       </p:ext>
     </p:extLst>
   </p:cSld>
@@ -8660,7 +8628,7 @@
           <a:bodyPr/>
           <a:lstStyle/>
           <a:p>
-            <a:endParaRPr lang="en-CA"/>
+            <a:endParaRPr lang="en-CA" dirty="0"/>
           </a:p>
         </p:txBody>
       </p:sp>
@@ -8679,6 +8647,135 @@
           <a:bodyPr/>
           <a:lstStyle/>
           <a:p>
+            <a:endParaRPr lang="en-CA" dirty="0"/>
+          </a:p>
+        </p:txBody>
+      </p:sp>
+      <p:pic>
+        <p:nvPicPr>
+          <p:cNvPr id="6" name="Picture 5"/>
+          <p:cNvPicPr>
+            <a:picLocks noChangeAspect="1"/>
+          </p:cNvPicPr>
+          <p:nvPr/>
+        </p:nvPicPr>
+        <p:blipFill>
+          <a:blip r:embed="rId2"/>
+          <a:stretch>
+            <a:fillRect/>
+          </a:stretch>
+        </p:blipFill>
+        <p:spPr>
+          <a:xfrm>
+            <a:off x="7743978" y="3116176"/>
+            <a:ext cx="4095750" cy="3257550"/>
+          </a:xfrm>
+          <a:prstGeom prst="rect">
+            <a:avLst/>
+          </a:prstGeom>
+        </p:spPr>
+      </p:pic>
+      <p:pic>
+        <p:nvPicPr>
+          <p:cNvPr id="7" name="Picture 6"/>
+          <p:cNvPicPr>
+            <a:picLocks noChangeAspect="1"/>
+          </p:cNvPicPr>
+          <p:nvPr/>
+        </p:nvPicPr>
+        <p:blipFill>
+          <a:blip r:embed="rId3"/>
+          <a:stretch>
+            <a:fillRect/>
+          </a:stretch>
+        </p:blipFill>
+        <p:spPr>
+          <a:xfrm>
+            <a:off x="7743978" y="685800"/>
+            <a:ext cx="3429000" cy="2209800"/>
+          </a:xfrm>
+          <a:prstGeom prst="rect">
+            <a:avLst/>
+          </a:prstGeom>
+        </p:spPr>
+      </p:pic>
+      <p:pic>
+        <p:nvPicPr>
+          <p:cNvPr id="1026" name="Picture 2" descr="http://www.co-optimus.com/images/upload/image/classic/starcraft01.jpg"/>
+          <p:cNvPicPr>
+            <a:picLocks noChangeAspect="1" noChangeArrowheads="1"/>
+          </p:cNvPicPr>
+          <p:nvPr/>
+        </p:nvPicPr>
+        <p:blipFill>
+          <a:blip r:embed="rId4">
+            <a:extLst>
+              <a:ext uri="{28A0092B-C50C-407E-A947-70E740481C1C}">
+                <a14:useLocalDpi xmlns:a14="http://schemas.microsoft.com/office/drawing/2010/main" val="0"/>
+              </a:ext>
+            </a:extLst>
+          </a:blip>
+          <a:srcRect/>
+          <a:stretch>
+            <a:fillRect/>
+          </a:stretch>
+        </p:blipFill>
+        <p:spPr bwMode="auto">
+          <a:xfrm>
+            <a:off x="320354" y="1593848"/>
+            <a:ext cx="5867400" cy="4400551"/>
+          </a:xfrm>
+          <a:prstGeom prst="rect">
+            <a:avLst/>
+          </a:prstGeom>
+          <a:noFill/>
+          <a:extLst>
+            <a:ext uri="{909E8E84-426E-40DD-AFC4-6F175D3DCCD1}">
+              <a14:hiddenFill xmlns:a14="http://schemas.microsoft.com/office/drawing/2010/main">
+                <a:solidFill>
+                  <a:srgbClr val="FFFFFF"/>
+                </a:solidFill>
+              </a14:hiddenFill>
+            </a:ext>
+          </a:extLst>
+        </p:spPr>
+      </p:pic>
+      <p:sp>
+        <p:nvSpPr>
+          <p:cNvPr id="4" name="Right Arrow 3"/>
+          <p:cNvSpPr/>
+          <p:nvPr/>
+        </p:nvSpPr>
+        <p:spPr>
+          <a:xfrm>
+            <a:off x="6387092" y="2360967"/>
+            <a:ext cx="1091953" cy="1358283"/>
+          </a:xfrm>
+          <a:prstGeom prst="rightArrow">
+            <a:avLst/>
+          </a:prstGeom>
+        </p:spPr>
+        <p:style>
+          <a:lnRef idx="2">
+            <a:schemeClr val="accent1">
+              <a:shade val="50000"/>
+            </a:schemeClr>
+          </a:lnRef>
+          <a:fillRef idx="1">
+            <a:schemeClr val="accent1"/>
+          </a:fillRef>
+          <a:effectRef idx="0">
+            <a:schemeClr val="accent1"/>
+          </a:effectRef>
+          <a:fontRef idx="minor">
+            <a:schemeClr val="lt1"/>
+          </a:fontRef>
+        </p:style>
+        <p:txBody>
+          <a:bodyPr rtlCol="0" anchor="ctr"/>
+          <a:lstStyle/>
+          <a:p>
+            <a:pPr algn="ctr"/>
             <a:endParaRPr lang="en-CA"/>
           </a:p>
         </p:txBody>
@@ -8686,7 +8783,7 @@
     </p:spTree>
     <p:extLst>
       <p:ext uri="{BB962C8B-B14F-4D97-AF65-F5344CB8AC3E}">
-        <p14:creationId xmlns:p14="http://schemas.microsoft.com/office/powerpoint/2010/main" val="42153519"/>
+        <p14:creationId xmlns:p14="http://schemas.microsoft.com/office/powerpoint/2010/main" val="4239688365"/>
       </p:ext>
     </p:extLst>
   </p:cSld>
@@ -8836,7 +8933,279 @@
     </p:spTree>
     <p:extLst>
       <p:ext uri="{BB962C8B-B14F-4D97-AF65-F5344CB8AC3E}">
+        <p14:creationId xmlns:p14="http://schemas.microsoft.com/office/powerpoint/2010/main" val="3575289003"/>
+      </p:ext>
+    </p:extLst>
+  </p:cSld>
+  <p:clrMapOvr>
+    <a:masterClrMapping/>
+  </p:clrMapOvr>
+</p:sld>
+</file>
+
+<file path=ppt/slides/slide6.xml><?xml version="1.0" encoding="utf-8"?>
+<p:sld xmlns:a="http://schemas.openxmlformats.org/drawingml/2006/main" xmlns:r="http://schemas.openxmlformats.org/officeDocument/2006/relationships" xmlns:p="http://schemas.openxmlformats.org/presentationml/2006/main">
+  <p:cSld>
+    <p:spTree>
+      <p:nvGrpSpPr>
+        <p:cNvPr id="1" name=""/>
+        <p:cNvGrpSpPr/>
+        <p:nvPr/>
+      </p:nvGrpSpPr>
+      <p:grpSpPr>
+        <a:xfrm>
+          <a:off x="0" y="0"/>
+          <a:ext cx="0" cy="0"/>
+          <a:chOff x="0" y="0"/>
+          <a:chExt cx="0" cy="0"/>
+        </a:xfrm>
+      </p:grpSpPr>
+      <p:sp>
+        <p:nvSpPr>
+          <p:cNvPr id="2" name="Title 1"/>
+          <p:cNvSpPr>
+            <a:spLocks noGrp="1"/>
+          </p:cNvSpPr>
+          <p:nvPr>
+            <p:ph type="title"/>
+          </p:nvPr>
+        </p:nvSpPr>
+        <p:spPr/>
+        <p:txBody>
+          <a:bodyPr/>
+          <a:lstStyle/>
+          <a:p>
+            <a:endParaRPr lang="en-CA"/>
+          </a:p>
+        </p:txBody>
+      </p:sp>
+      <p:sp>
+        <p:nvSpPr>
+          <p:cNvPr id="3" name="Content Placeholder 2"/>
+          <p:cNvSpPr>
+            <a:spLocks noGrp="1"/>
+          </p:cNvSpPr>
+          <p:nvPr>
+            <p:ph idx="1"/>
+          </p:nvPr>
+        </p:nvSpPr>
+        <p:spPr/>
+        <p:txBody>
+          <a:bodyPr/>
+          <a:lstStyle/>
+          <a:p>
+            <a:endParaRPr lang="en-CA"/>
+          </a:p>
+        </p:txBody>
+      </p:sp>
+    </p:spTree>
+    <p:extLst>
+      <p:ext uri="{BB962C8B-B14F-4D97-AF65-F5344CB8AC3E}">
+        <p14:creationId xmlns:p14="http://schemas.microsoft.com/office/powerpoint/2010/main" val="2142410141"/>
+      </p:ext>
+    </p:extLst>
+  </p:cSld>
+  <p:clrMapOvr>
+    <a:masterClrMapping/>
+  </p:clrMapOvr>
+</p:sld>
+</file>
+
+<file path=ppt/slides/slide7.xml><?xml version="1.0" encoding="utf-8"?>
+<p:sld xmlns:a="http://schemas.openxmlformats.org/drawingml/2006/main" xmlns:r="http://schemas.openxmlformats.org/officeDocument/2006/relationships" xmlns:p="http://schemas.openxmlformats.org/presentationml/2006/main">
+  <p:cSld>
+    <p:spTree>
+      <p:nvGrpSpPr>
+        <p:cNvPr id="1" name=""/>
+        <p:cNvGrpSpPr/>
+        <p:nvPr/>
+      </p:nvGrpSpPr>
+      <p:grpSpPr>
+        <a:xfrm>
+          <a:off x="0" y="0"/>
+          <a:ext cx="0" cy="0"/>
+          <a:chOff x="0" y="0"/>
+          <a:chExt cx="0" cy="0"/>
+        </a:xfrm>
+      </p:grpSpPr>
+      <p:sp>
+        <p:nvSpPr>
+          <p:cNvPr id="2" name="Title 1"/>
+          <p:cNvSpPr>
+            <a:spLocks noGrp="1"/>
+          </p:cNvSpPr>
+          <p:nvPr>
+            <p:ph type="title"/>
+          </p:nvPr>
+        </p:nvSpPr>
+        <p:spPr/>
+        <p:txBody>
+          <a:bodyPr/>
+          <a:lstStyle/>
+          <a:p>
+            <a:endParaRPr lang="en-CA"/>
+          </a:p>
+        </p:txBody>
+      </p:sp>
+      <p:sp>
+        <p:nvSpPr>
+          <p:cNvPr id="3" name="Content Placeholder 2"/>
+          <p:cNvSpPr>
+            <a:spLocks noGrp="1"/>
+          </p:cNvSpPr>
+          <p:nvPr>
+            <p:ph idx="1"/>
+          </p:nvPr>
+        </p:nvSpPr>
+        <p:spPr/>
+        <p:txBody>
+          <a:bodyPr/>
+          <a:lstStyle/>
+          <a:p>
+            <a:endParaRPr lang="en-CA"/>
+          </a:p>
+        </p:txBody>
+      </p:sp>
+    </p:spTree>
+    <p:extLst>
+      <p:ext uri="{BB962C8B-B14F-4D97-AF65-F5344CB8AC3E}">
+        <p14:creationId xmlns:p14="http://schemas.microsoft.com/office/powerpoint/2010/main" val="446922962"/>
+      </p:ext>
+    </p:extLst>
+  </p:cSld>
+  <p:clrMapOvr>
+    <a:masterClrMapping/>
+  </p:clrMapOvr>
+</p:sld>
+</file>
+
+<file path=ppt/slides/slide8.xml><?xml version="1.0" encoding="utf-8"?>
+<p:sld xmlns:a="http://schemas.openxmlformats.org/drawingml/2006/main" xmlns:r="http://schemas.openxmlformats.org/officeDocument/2006/relationships" xmlns:p="http://schemas.openxmlformats.org/presentationml/2006/main">
+  <p:cSld>
+    <p:spTree>
+      <p:nvGrpSpPr>
+        <p:cNvPr id="1" name=""/>
+        <p:cNvGrpSpPr/>
+        <p:nvPr/>
+      </p:nvGrpSpPr>
+      <p:grpSpPr>
+        <a:xfrm>
+          <a:off x="0" y="0"/>
+          <a:ext cx="0" cy="0"/>
+          <a:chOff x="0" y="0"/>
+          <a:chExt cx="0" cy="0"/>
+        </a:xfrm>
+      </p:grpSpPr>
+      <p:sp>
+        <p:nvSpPr>
+          <p:cNvPr id="2" name="Title 1"/>
+          <p:cNvSpPr>
+            <a:spLocks noGrp="1"/>
+          </p:cNvSpPr>
+          <p:nvPr>
+            <p:ph type="title"/>
+          </p:nvPr>
+        </p:nvSpPr>
+        <p:spPr/>
+        <p:txBody>
+          <a:bodyPr/>
+          <a:lstStyle/>
+          <a:p>
+            <a:endParaRPr lang="en-CA"/>
+          </a:p>
+        </p:txBody>
+      </p:sp>
+      <p:sp>
+        <p:nvSpPr>
+          <p:cNvPr id="3" name="Content Placeholder 2"/>
+          <p:cNvSpPr>
+            <a:spLocks noGrp="1"/>
+          </p:cNvSpPr>
+          <p:nvPr>
+            <p:ph idx="1"/>
+          </p:nvPr>
+        </p:nvSpPr>
+        <p:spPr/>
+        <p:txBody>
+          <a:bodyPr/>
+          <a:lstStyle/>
+          <a:p>
+            <a:endParaRPr lang="en-CA"/>
+          </a:p>
+        </p:txBody>
+      </p:sp>
+    </p:spTree>
+    <p:extLst>
+      <p:ext uri="{BB962C8B-B14F-4D97-AF65-F5344CB8AC3E}">
         <p14:creationId xmlns:p14="http://schemas.microsoft.com/office/powerpoint/2010/main" val="3377074906"/>
+      </p:ext>
+    </p:extLst>
+  </p:cSld>
+  <p:clrMapOvr>
+    <a:masterClrMapping/>
+  </p:clrMapOvr>
+</p:sld>
+</file>
+
+<file path=ppt/slides/slide9.xml><?xml version="1.0" encoding="utf-8"?>
+<p:sld xmlns:a="http://schemas.openxmlformats.org/drawingml/2006/main" xmlns:r="http://schemas.openxmlformats.org/officeDocument/2006/relationships" xmlns:p="http://schemas.openxmlformats.org/presentationml/2006/main">
+  <p:cSld>
+    <p:spTree>
+      <p:nvGrpSpPr>
+        <p:cNvPr id="1" name=""/>
+        <p:cNvGrpSpPr/>
+        <p:nvPr/>
+      </p:nvGrpSpPr>
+      <p:grpSpPr>
+        <a:xfrm>
+          <a:off x="0" y="0"/>
+          <a:ext cx="0" cy="0"/>
+          <a:chOff x="0" y="0"/>
+          <a:chExt cx="0" cy="0"/>
+        </a:xfrm>
+      </p:grpSpPr>
+      <p:sp>
+        <p:nvSpPr>
+          <p:cNvPr id="2" name="Title 1"/>
+          <p:cNvSpPr>
+            <a:spLocks noGrp="1"/>
+          </p:cNvSpPr>
+          <p:nvPr>
+            <p:ph type="title"/>
+          </p:nvPr>
+        </p:nvSpPr>
+        <p:spPr/>
+        <p:txBody>
+          <a:bodyPr/>
+          <a:lstStyle/>
+          <a:p>
+            <a:endParaRPr lang="en-CA"/>
+          </a:p>
+        </p:txBody>
+      </p:sp>
+      <p:sp>
+        <p:nvSpPr>
+          <p:cNvPr id="3" name="Content Placeholder 2"/>
+          <p:cNvSpPr>
+            <a:spLocks noGrp="1"/>
+          </p:cNvSpPr>
+          <p:nvPr>
+            <p:ph idx="1"/>
+          </p:nvPr>
+        </p:nvSpPr>
+        <p:spPr/>
+        <p:txBody>
+          <a:bodyPr/>
+          <a:lstStyle/>
+          <a:p>
+            <a:endParaRPr lang="en-CA"/>
+          </a:p>
+        </p:txBody>
+      </p:sp>
+    </p:spTree>
+    <p:extLst>
+      <p:ext uri="{BB962C8B-B14F-4D97-AF65-F5344CB8AC3E}">
+        <p14:creationId xmlns:p14="http://schemas.microsoft.com/office/powerpoint/2010/main" val="3455770087"/>
       </p:ext>
     </p:extLst>
   </p:cSld>

</xml_diff>